<commit_message>
Aggiunte foto ed effetti al powerpoint
</commit_message>
<xml_diff>
--- a/Varie/Presentazione.pptx
+++ b/Varie/Presentazione.pptx
@@ -7,11 +7,12 @@
   <p:sldIdLst>
     <p:sldId id="258" r:id="rId2"/>
     <p:sldId id="264" r:id="rId3"/>
-    <p:sldId id="269" r:id="rId4"/>
-    <p:sldId id="265" r:id="rId5"/>
-    <p:sldId id="266" r:id="rId6"/>
-    <p:sldId id="267" r:id="rId7"/>
-    <p:sldId id="268" r:id="rId8"/>
+    <p:sldId id="270" r:id="rId4"/>
+    <p:sldId id="269" r:id="rId5"/>
+    <p:sldId id="265" r:id="rId6"/>
+    <p:sldId id="266" r:id="rId7"/>
+    <p:sldId id="267" r:id="rId8"/>
+    <p:sldId id="268" r:id="rId9"/>
   </p:sldIdLst>
   <p:sldSz cx="12192000" cy="6858000"/>
   <p:notesSz cx="6858000" cy="9144000"/>
@@ -111,6 +112,42 @@
     </a:lvl9pPr>
   </p:defaultTextStyle>
   <p:extLst>
+    <p:ext uri="{521415D9-36F7-43E2-AB2F-B90AF26B5E84}">
+      <p14:sectionLst xmlns:p14="http://schemas.microsoft.com/office/powerpoint/2010/main">
+        <p14:section name="Sezione predefinita" id="{104C9464-4C57-44E8-8AF5-59102C876DA1}">
+          <p14:sldIdLst>
+            <p14:sldId id="258"/>
+          </p14:sldIdLst>
+        </p14:section>
+        <p14:section name="Idea" id="{125A8D11-817A-4A51-98B7-4F5382F81CE6}">
+          <p14:sldIdLst>
+            <p14:sldId id="264"/>
+            <p14:sldId id="270"/>
+            <p14:sldId id="269"/>
+          </p14:sldIdLst>
+        </p14:section>
+        <p14:section name="Client" id="{D7B4F224-F83A-4803-89AC-FF3E959C4788}">
+          <p14:sldIdLst>
+            <p14:sldId id="265"/>
+          </p14:sldIdLst>
+        </p14:section>
+        <p14:section name="Back-end" id="{07AB1CD6-77B7-4A54-BF5C-91EC31C77BAE}">
+          <p14:sldIdLst>
+            <p14:sldId id="266"/>
+          </p14:sldIdLst>
+        </p14:section>
+        <p14:section name="Cloud" id="{49A28F30-0D3C-4C7A-890B-2B2CBD7E3134}">
+          <p14:sldIdLst>
+            <p14:sldId id="267"/>
+          </p14:sldIdLst>
+        </p14:section>
+        <p14:section name="Saluti e ringraziamenti" id="{8BF048DE-5D84-4E10-9C8D-420BABB56982}">
+          <p14:sldIdLst>
+            <p14:sldId id="268"/>
+          </p14:sldIdLst>
+        </p14:section>
+      </p14:sectionLst>
+    </p:ext>
     <p:ext uri="{EFAFB233-063F-42B5-8137-9DF3F51BA10A}">
       <p15:sldGuideLst xmlns:p15="http://schemas.microsoft.com/office/powerpoint/2012/main">
         <p15:guide id="1" orient="horz" pos="2160" userDrawn="1">
@@ -276,7 +313,7 @@
           <a:p>
             <a:fld id="{D1B804D9-6A3C-4A49-AACC-26C8A614B2B6}" type="datetimeFigureOut">
               <a:rPr lang="it-IT" smtClean="0"/>
-              <a:t>15/03/2022</a:t>
+              <a:t>16/03/2022</a:t>
             </a:fld>
             <a:endParaRPr lang="it-IT"/>
           </a:p>
@@ -474,7 +511,7 @@
           <a:p>
             <a:fld id="{D1B804D9-6A3C-4A49-AACC-26C8A614B2B6}" type="datetimeFigureOut">
               <a:rPr lang="it-IT" smtClean="0"/>
-              <a:t>15/03/2022</a:t>
+              <a:t>16/03/2022</a:t>
             </a:fld>
             <a:endParaRPr lang="it-IT"/>
           </a:p>
@@ -682,7 +719,7 @@
           <a:p>
             <a:fld id="{D1B804D9-6A3C-4A49-AACC-26C8A614B2B6}" type="datetimeFigureOut">
               <a:rPr lang="it-IT" smtClean="0"/>
-              <a:t>15/03/2022</a:t>
+              <a:t>16/03/2022</a:t>
             </a:fld>
             <a:endParaRPr lang="it-IT"/>
           </a:p>
@@ -880,7 +917,7 @@
           <a:p>
             <a:fld id="{D1B804D9-6A3C-4A49-AACC-26C8A614B2B6}" type="datetimeFigureOut">
               <a:rPr lang="it-IT" smtClean="0"/>
-              <a:t>15/03/2022</a:t>
+              <a:t>16/03/2022</a:t>
             </a:fld>
             <a:endParaRPr lang="it-IT"/>
           </a:p>
@@ -1155,7 +1192,7 @@
           <a:p>
             <a:fld id="{D1B804D9-6A3C-4A49-AACC-26C8A614B2B6}" type="datetimeFigureOut">
               <a:rPr lang="it-IT" smtClean="0"/>
-              <a:t>15/03/2022</a:t>
+              <a:t>16/03/2022</a:t>
             </a:fld>
             <a:endParaRPr lang="it-IT"/>
           </a:p>
@@ -1420,7 +1457,7 @@
           <a:p>
             <a:fld id="{D1B804D9-6A3C-4A49-AACC-26C8A614B2B6}" type="datetimeFigureOut">
               <a:rPr lang="it-IT" smtClean="0"/>
-              <a:t>15/03/2022</a:t>
+              <a:t>16/03/2022</a:t>
             </a:fld>
             <a:endParaRPr lang="it-IT"/>
           </a:p>
@@ -1832,7 +1869,7 @@
           <a:p>
             <a:fld id="{D1B804D9-6A3C-4A49-AACC-26C8A614B2B6}" type="datetimeFigureOut">
               <a:rPr lang="it-IT" smtClean="0"/>
-              <a:t>15/03/2022</a:t>
+              <a:t>16/03/2022</a:t>
             </a:fld>
             <a:endParaRPr lang="it-IT"/>
           </a:p>
@@ -1973,7 +2010,7 @@
           <a:p>
             <a:fld id="{D1B804D9-6A3C-4A49-AACC-26C8A614B2B6}" type="datetimeFigureOut">
               <a:rPr lang="it-IT" smtClean="0"/>
-              <a:t>15/03/2022</a:t>
+              <a:t>16/03/2022</a:t>
             </a:fld>
             <a:endParaRPr lang="it-IT"/>
           </a:p>
@@ -2086,7 +2123,7 @@
           <a:p>
             <a:fld id="{D1B804D9-6A3C-4A49-AACC-26C8A614B2B6}" type="datetimeFigureOut">
               <a:rPr lang="it-IT" smtClean="0"/>
-              <a:t>15/03/2022</a:t>
+              <a:t>16/03/2022</a:t>
             </a:fld>
             <a:endParaRPr lang="it-IT"/>
           </a:p>
@@ -2397,7 +2434,7 @@
           <a:p>
             <a:fld id="{D1B804D9-6A3C-4A49-AACC-26C8A614B2B6}" type="datetimeFigureOut">
               <a:rPr lang="it-IT" smtClean="0"/>
-              <a:t>15/03/2022</a:t>
+              <a:t>16/03/2022</a:t>
             </a:fld>
             <a:endParaRPr lang="it-IT"/>
           </a:p>
@@ -2685,7 +2722,7 @@
           <a:p>
             <a:fld id="{D1B804D9-6A3C-4A49-AACC-26C8A614B2B6}" type="datetimeFigureOut">
               <a:rPr lang="it-IT" smtClean="0"/>
-              <a:t>15/03/2022</a:t>
+              <a:t>16/03/2022</a:t>
             </a:fld>
             <a:endParaRPr lang="it-IT"/>
           </a:p>
@@ -2926,7 +2963,7 @@
           <a:p>
             <a:fld id="{D1B804D9-6A3C-4A49-AACC-26C8A614B2B6}" type="datetimeFigureOut">
               <a:rPr lang="it-IT" smtClean="0"/>
-              <a:t>15/03/2022</a:t>
+              <a:t>16/03/2022</a:t>
             </a:fld>
             <a:endParaRPr lang="it-IT"/>
           </a:p>
@@ -7384,6 +7421,1066 @@
           </a:p>
         </p:txBody>
       </p:sp>
+      <p:grpSp>
+        <p:nvGrpSpPr>
+          <p:cNvPr id="43" name="Gruppo 42">
+            <a:extLst>
+              <a:ext uri="{FF2B5EF4-FFF2-40B4-BE49-F238E27FC236}">
+                <a16:creationId xmlns:a16="http://schemas.microsoft.com/office/drawing/2014/main" id="{E1CF1412-3B9D-4FAB-998A-CD1A5A5D29C0}"/>
+              </a:ext>
+            </a:extLst>
+          </p:cNvPr>
+          <p:cNvGrpSpPr/>
+          <p:nvPr/>
+        </p:nvGrpSpPr>
+        <p:grpSpPr>
+          <a:xfrm>
+            <a:off x="221907" y="324398"/>
+            <a:ext cx="648387" cy="6215290"/>
+            <a:chOff x="221907" y="324398"/>
+            <a:chExt cx="648387" cy="6215290"/>
+          </a:xfrm>
+        </p:grpSpPr>
+        <p:pic>
+          <p:nvPicPr>
+            <p:cNvPr id="31" name="Elemento grafico 30" descr="Luci accese con riempimento a tinta unita">
+              <a:hlinkClick r:id="rId12" action="ppaction://hlinksldjump"/>
+              <a:extLst>
+                <a:ext uri="{FF2B5EF4-FFF2-40B4-BE49-F238E27FC236}">
+                  <a16:creationId xmlns:a16="http://schemas.microsoft.com/office/drawing/2014/main" id="{681F6197-24DD-438A-BBB9-CAFF11825FC5}"/>
+                </a:ext>
+              </a:extLst>
+            </p:cNvPr>
+            <p:cNvPicPr>
+              <a:picLocks noChangeAspect="1"/>
+            </p:cNvPicPr>
+            <p:nvPr/>
+          </p:nvPicPr>
+          <p:blipFill>
+            <a:blip r:embed="rId13">
+              <a:extLst>
+                <a:ext uri="{28A0092B-C50C-407E-A947-70E740481C1C}">
+                  <a14:useLocalDpi xmlns:a14="http://schemas.microsoft.com/office/drawing/2010/main" val="0"/>
+                </a:ext>
+                <a:ext uri="{96DAC541-7B7A-43D3-8B79-37D633B846F1}">
+                  <asvg:svgBlip xmlns:asvg="http://schemas.microsoft.com/office/drawing/2016/SVG/main" r:embed="rId14"/>
+                </a:ext>
+              </a:extLst>
+            </a:blip>
+            <a:stretch>
+              <a:fillRect/>
+            </a:stretch>
+          </p:blipFill>
+          <p:spPr>
+            <a:xfrm>
+              <a:off x="221907" y="324398"/>
+              <a:ext cx="648387" cy="648387"/>
+            </a:xfrm>
+            <a:prstGeom prst="rect">
+              <a:avLst/>
+            </a:prstGeom>
+          </p:spPr>
+        </p:pic>
+        <p:pic>
+          <p:nvPicPr>
+            <p:cNvPr id="32" name="Elemento grafico 31" descr="Database con riempimento a tinta unita">
+              <a:hlinkClick r:id="rId15" action="ppaction://hlinksldjump"/>
+              <a:extLst>
+                <a:ext uri="{FF2B5EF4-FFF2-40B4-BE49-F238E27FC236}">
+                  <a16:creationId xmlns:a16="http://schemas.microsoft.com/office/drawing/2014/main" id="{0C45B2A5-EC7E-4113-B843-1BC4EE1A588C}"/>
+                </a:ext>
+              </a:extLst>
+            </p:cNvPr>
+            <p:cNvPicPr>
+              <a:picLocks noChangeAspect="1"/>
+            </p:cNvPicPr>
+            <p:nvPr/>
+          </p:nvPicPr>
+          <p:blipFill>
+            <a:blip r:embed="rId16">
+              <a:extLst>
+                <a:ext uri="{28A0092B-C50C-407E-A947-70E740481C1C}">
+                  <a14:useLocalDpi xmlns:a14="http://schemas.microsoft.com/office/drawing/2010/main" val="0"/>
+                </a:ext>
+                <a:ext uri="{96DAC541-7B7A-43D3-8B79-37D633B846F1}">
+                  <asvg:svgBlip xmlns:asvg="http://schemas.microsoft.com/office/drawing/2016/SVG/main" r:embed="rId17"/>
+                </a:ext>
+              </a:extLst>
+            </a:blip>
+            <a:stretch>
+              <a:fillRect/>
+            </a:stretch>
+          </p:blipFill>
+          <p:spPr>
+            <a:xfrm>
+              <a:off x="221907" y="3111254"/>
+              <a:ext cx="648387" cy="648387"/>
+            </a:xfrm>
+            <a:prstGeom prst="rect">
+              <a:avLst/>
+            </a:prstGeom>
+          </p:spPr>
+        </p:pic>
+        <p:pic>
+          <p:nvPicPr>
+            <p:cNvPr id="33" name="Elemento grafico 32" descr="Smartphone con riempimento a tinta unita">
+              <a:hlinkClick r:id="rId18" action="ppaction://hlinksldjump"/>
+              <a:extLst>
+                <a:ext uri="{FF2B5EF4-FFF2-40B4-BE49-F238E27FC236}">
+                  <a16:creationId xmlns:a16="http://schemas.microsoft.com/office/drawing/2014/main" id="{C98EF3FB-B812-4547-816B-F320138BCE1F}"/>
+                </a:ext>
+              </a:extLst>
+            </p:cNvPr>
+            <p:cNvPicPr>
+              <a:picLocks noChangeAspect="1"/>
+            </p:cNvPicPr>
+            <p:nvPr/>
+          </p:nvPicPr>
+          <p:blipFill>
+            <a:blip r:embed="rId19">
+              <a:extLst>
+                <a:ext uri="{28A0092B-C50C-407E-A947-70E740481C1C}">
+                  <a14:useLocalDpi xmlns:a14="http://schemas.microsoft.com/office/drawing/2010/main" val="0"/>
+                </a:ext>
+                <a:ext uri="{96DAC541-7B7A-43D3-8B79-37D633B846F1}">
+                  <asvg:svgBlip xmlns:asvg="http://schemas.microsoft.com/office/drawing/2016/SVG/main" r:embed="rId20"/>
+                </a:ext>
+              </a:extLst>
+            </a:blip>
+            <a:stretch>
+              <a:fillRect/>
+            </a:stretch>
+          </p:blipFill>
+          <p:spPr>
+            <a:xfrm>
+              <a:off x="221907" y="1714602"/>
+              <a:ext cx="648387" cy="648387"/>
+            </a:xfrm>
+            <a:prstGeom prst="rect">
+              <a:avLst/>
+            </a:prstGeom>
+          </p:spPr>
+        </p:pic>
+        <p:pic>
+          <p:nvPicPr>
+            <p:cNvPr id="34" name="Elemento grafico 33" descr="Internet delle cose con riempimento a tinta unita">
+              <a:hlinkClick r:id="rId21" action="ppaction://hlinksldjump"/>
+              <a:extLst>
+                <a:ext uri="{FF2B5EF4-FFF2-40B4-BE49-F238E27FC236}">
+                  <a16:creationId xmlns:a16="http://schemas.microsoft.com/office/drawing/2014/main" id="{EFF6F2C3-5EAC-494C-87DB-8B63DFEF3BB4}"/>
+                </a:ext>
+              </a:extLst>
+            </p:cNvPr>
+            <p:cNvPicPr>
+              <a:picLocks noChangeAspect="1"/>
+            </p:cNvPicPr>
+            <p:nvPr/>
+          </p:nvPicPr>
+          <p:blipFill>
+            <a:blip r:embed="rId22">
+              <a:extLst>
+                <a:ext uri="{28A0092B-C50C-407E-A947-70E740481C1C}">
+                  <a14:useLocalDpi xmlns:a14="http://schemas.microsoft.com/office/drawing/2010/main" val="0"/>
+                </a:ext>
+                <a:ext uri="{96DAC541-7B7A-43D3-8B79-37D633B846F1}">
+                  <asvg:svgBlip xmlns:asvg="http://schemas.microsoft.com/office/drawing/2016/SVG/main" r:embed="rId23"/>
+                </a:ext>
+              </a:extLst>
+            </a:blip>
+            <a:stretch>
+              <a:fillRect/>
+            </a:stretch>
+          </p:blipFill>
+          <p:spPr>
+            <a:xfrm>
+              <a:off x="221907" y="4495010"/>
+              <a:ext cx="648387" cy="648387"/>
+            </a:xfrm>
+            <a:prstGeom prst="rect">
+              <a:avLst/>
+            </a:prstGeom>
+          </p:spPr>
+        </p:pic>
+        <p:pic>
+          <p:nvPicPr>
+            <p:cNvPr id="35" name="Elemento grafico 34" descr="Utenti con riempimento a tinta unita">
+              <a:hlinkClick r:id="rId24" action="ppaction://hlinksldjump"/>
+              <a:extLst>
+                <a:ext uri="{FF2B5EF4-FFF2-40B4-BE49-F238E27FC236}">
+                  <a16:creationId xmlns:a16="http://schemas.microsoft.com/office/drawing/2014/main" id="{AA009A78-0E3E-457D-8075-D346F46AB9C3}"/>
+                </a:ext>
+              </a:extLst>
+            </p:cNvPr>
+            <p:cNvPicPr>
+              <a:picLocks noChangeAspect="1"/>
+            </p:cNvPicPr>
+            <p:nvPr/>
+          </p:nvPicPr>
+          <p:blipFill>
+            <a:blip r:embed="rId25">
+              <a:extLst>
+                <a:ext uri="{28A0092B-C50C-407E-A947-70E740481C1C}">
+                  <a14:useLocalDpi xmlns:a14="http://schemas.microsoft.com/office/drawing/2010/main" val="0"/>
+                </a:ext>
+                <a:ext uri="{96DAC541-7B7A-43D3-8B79-37D633B846F1}">
+                  <asvg:svgBlip xmlns:asvg="http://schemas.microsoft.com/office/drawing/2016/SVG/main" r:embed="rId26"/>
+                </a:ext>
+              </a:extLst>
+            </a:blip>
+            <a:stretch>
+              <a:fillRect/>
+            </a:stretch>
+          </p:blipFill>
+          <p:spPr>
+            <a:xfrm>
+              <a:off x="221907" y="5891301"/>
+              <a:ext cx="648387" cy="648387"/>
+            </a:xfrm>
+            <a:prstGeom prst="rect">
+              <a:avLst/>
+            </a:prstGeom>
+          </p:spPr>
+        </p:pic>
+      </p:grpSp>
+      <p:pic>
+        <p:nvPicPr>
+          <p:cNvPr id="6" name="Elemento grafico 5" descr="Play con riempimento a tinta unita">
+            <a:hlinkClick r:id="rId27" action="ppaction://hlinksldjump"/>
+            <a:extLst>
+              <a:ext uri="{FF2B5EF4-FFF2-40B4-BE49-F238E27FC236}">
+                <a16:creationId xmlns:a16="http://schemas.microsoft.com/office/drawing/2014/main" id="{0FFA293F-D367-4481-A05B-7D33725AEBDC}"/>
+              </a:ext>
+            </a:extLst>
+          </p:cNvPr>
+          <p:cNvPicPr>
+            <a:picLocks noChangeAspect="1"/>
+          </p:cNvPicPr>
+          <p:nvPr/>
+        </p:nvPicPr>
+        <p:blipFill>
+          <a:blip r:embed="rId28">
+            <a:extLst>
+              <a:ext uri="{28A0092B-C50C-407E-A947-70E740481C1C}">
+                <a14:useLocalDpi xmlns:a14="http://schemas.microsoft.com/office/drawing/2010/main" val="0"/>
+              </a:ext>
+              <a:ext uri="{96DAC541-7B7A-43D3-8B79-37D633B846F1}">
+                <asvg:svgBlip xmlns:asvg="http://schemas.microsoft.com/office/drawing/2016/SVG/main" r:embed="rId29"/>
+              </a:ext>
+            </a:extLst>
+          </a:blip>
+          <a:stretch>
+            <a:fillRect/>
+          </a:stretch>
+        </p:blipFill>
+        <p:spPr>
+          <a:xfrm>
+            <a:off x="4694100" y="1463120"/>
+            <a:ext cx="3931759" cy="3931759"/>
+          </a:xfrm>
+          <a:prstGeom prst="rect">
+            <a:avLst/>
+          </a:prstGeom>
+        </p:spPr>
+      </p:pic>
+    </p:spTree>
+    <p:extLst>
+      <p:ext uri="{BB962C8B-B14F-4D97-AF65-F5344CB8AC3E}">
+        <p14:creationId xmlns:p14="http://schemas.microsoft.com/office/powerpoint/2010/main" val="742665214"/>
+      </p:ext>
+    </p:extLst>
+  </p:cSld>
+  <p:clrMapOvr>
+    <a:masterClrMapping/>
+  </p:clrMapOvr>
+  <mc:AlternateContent xmlns:mc="http://schemas.openxmlformats.org/markup-compatibility/2006">
+    <mc:Choice xmlns:p159="http://schemas.microsoft.com/office/powerpoint/2015/09/main" Requires="p159">
+      <p:transition spd="slow" advTm="0">
+        <p159:morph option="byObject"/>
+      </p:transition>
+    </mc:Choice>
+    <mc:Fallback>
+      <p:transition spd="slow" advTm="0">
+        <p:fade/>
+      </p:transition>
+    </mc:Fallback>
+  </mc:AlternateContent>
+</p:sld>
+</file>
+
+<file path=ppt/slides/slide4.xml><?xml version="1.0" encoding="utf-8"?>
+<p:sld xmlns:a="http://schemas.openxmlformats.org/drawingml/2006/main" xmlns:r="http://schemas.openxmlformats.org/officeDocument/2006/relationships" xmlns:p="http://schemas.openxmlformats.org/presentationml/2006/main">
+  <p:cSld>
+    <p:bg>
+      <p:bgPr>
+        <a:gradFill>
+          <a:gsLst>
+            <a:gs pos="100000">
+              <a:schemeClr val="accent5">
+                <a:lumMod val="50000"/>
+              </a:schemeClr>
+            </a:gs>
+            <a:gs pos="100000">
+              <a:schemeClr val="accent5">
+                <a:lumMod val="50000"/>
+                <a:alpha val="24000"/>
+              </a:schemeClr>
+            </a:gs>
+            <a:gs pos="100000">
+              <a:schemeClr val="accent6">
+                <a:lumMod val="78000"/>
+              </a:schemeClr>
+            </a:gs>
+          </a:gsLst>
+          <a:lin ang="5400000" scaled="1"/>
+        </a:gradFill>
+        <a:effectLst/>
+      </p:bgPr>
+    </p:bg>
+    <p:spTree>
+      <p:nvGrpSpPr>
+        <p:cNvPr id="1" name=""/>
+        <p:cNvGrpSpPr/>
+        <p:nvPr/>
+      </p:nvGrpSpPr>
+      <p:grpSpPr>
+        <a:xfrm>
+          <a:off x="0" y="0"/>
+          <a:ext cx="0" cy="0"/>
+          <a:chOff x="0" y="0"/>
+          <a:chExt cx="0" cy="0"/>
+        </a:xfrm>
+      </p:grpSpPr>
+      <p:sp useBgFill="1">
+        <p:nvSpPr>
+          <p:cNvPr id="8" name="Rectangle 7">
+            <a:extLst>
+              <a:ext uri="{FF2B5EF4-FFF2-40B4-BE49-F238E27FC236}">
+                <a16:creationId xmlns:a16="http://schemas.microsoft.com/office/drawing/2014/main" id="{4613B4A9-1C7C-4729-A016-AB42D3979460}"/>
+              </a:ext>
+              <a:ext uri="{C183D7F6-B498-43B3-948B-1728B52AA6E4}">
+                <adec:decorative xmlns:adec="http://schemas.microsoft.com/office/drawing/2017/decorative" val="1"/>
+              </a:ext>
+            </a:extLst>
+          </p:cNvPr>
+          <p:cNvSpPr>
+            <a:spLocks noGrp="1" noRot="1" noChangeAspect="1" noMove="1" noResize="1" noEditPoints="1" noAdjustHandles="1" noChangeArrowheads="1" noChangeShapeType="1" noTextEdit="1"/>
+          </p:cNvSpPr>
+          <p:nvPr>
+            <p:extLst>
+              <p:ext uri="{386F3935-93C4-4BCD-93E2-E3B085C9AB24}">
+                <p16:designElem xmlns:p16="http://schemas.microsoft.com/office/powerpoint/2015/main" val="1"/>
+              </p:ext>
+            </p:extLst>
+          </p:nvPr>
+        </p:nvSpPr>
+        <p:spPr>
+          <a:xfrm>
+            <a:off x="0" y="0"/>
+            <a:ext cx="12188952" cy="6858000"/>
+          </a:xfrm>
+          <a:prstGeom prst="rect">
+            <a:avLst/>
+          </a:prstGeom>
+          <a:ln>
+            <a:noFill/>
+          </a:ln>
+        </p:spPr>
+        <p:style>
+          <a:lnRef idx="2">
+            <a:schemeClr val="accent1">
+              <a:shade val="50000"/>
+            </a:schemeClr>
+          </a:lnRef>
+          <a:fillRef idx="1">
+            <a:schemeClr val="accent1"/>
+          </a:fillRef>
+          <a:effectRef idx="0">
+            <a:schemeClr val="accent1"/>
+          </a:effectRef>
+          <a:fontRef idx="minor">
+            <a:schemeClr val="lt1"/>
+          </a:fontRef>
+        </p:style>
+        <p:txBody>
+          <a:bodyPr rtlCol="0" anchor="ctr"/>
+          <a:lstStyle/>
+          <a:p>
+            <a:pPr algn="ctr"/>
+            <a:endParaRPr lang="en-US"/>
+          </a:p>
+        </p:txBody>
+      </p:sp>
+      <p:grpSp>
+        <p:nvGrpSpPr>
+          <p:cNvPr id="38" name="Gruppo 37">
+            <a:extLst>
+              <a:ext uri="{FF2B5EF4-FFF2-40B4-BE49-F238E27FC236}">
+                <a16:creationId xmlns:a16="http://schemas.microsoft.com/office/drawing/2014/main" id="{09FFE3BA-A3CA-4312-BDF9-E86313F521A3}"/>
+              </a:ext>
+            </a:extLst>
+          </p:cNvPr>
+          <p:cNvGrpSpPr/>
+          <p:nvPr/>
+        </p:nvGrpSpPr>
+        <p:grpSpPr>
+          <a:xfrm>
+            <a:off x="688052" y="234592"/>
+            <a:ext cx="828000" cy="828000"/>
+            <a:chOff x="-858500" y="234592"/>
+            <a:chExt cx="828000" cy="828000"/>
+          </a:xfrm>
+        </p:grpSpPr>
+        <p:sp>
+          <p:nvSpPr>
+            <p:cNvPr id="27" name="Ovale 26">
+              <a:extLst>
+                <a:ext uri="{FF2B5EF4-FFF2-40B4-BE49-F238E27FC236}">
+                  <a16:creationId xmlns:a16="http://schemas.microsoft.com/office/drawing/2014/main" id="{20776417-92F6-4735-8BEB-C2789700D66D}"/>
+                </a:ext>
+              </a:extLst>
+            </p:cNvPr>
+            <p:cNvSpPr/>
+            <p:nvPr/>
+          </p:nvSpPr>
+          <p:spPr>
+            <a:xfrm>
+              <a:off x="-858500" y="234592"/>
+              <a:ext cx="828000" cy="828000"/>
+            </a:xfrm>
+            <a:prstGeom prst="ellipse">
+              <a:avLst/>
+            </a:prstGeom>
+            <a:solidFill>
+              <a:schemeClr val="bg1"/>
+            </a:solidFill>
+          </p:spPr>
+          <p:style>
+            <a:lnRef idx="2">
+              <a:schemeClr val="accent1">
+                <a:shade val="50000"/>
+              </a:schemeClr>
+            </a:lnRef>
+            <a:fillRef idx="1">
+              <a:schemeClr val="accent1"/>
+            </a:fillRef>
+            <a:effectRef idx="0">
+              <a:schemeClr val="accent1"/>
+            </a:effectRef>
+            <a:fontRef idx="minor">
+              <a:schemeClr val="lt1"/>
+            </a:fontRef>
+          </p:style>
+          <p:txBody>
+            <a:bodyPr rtlCol="0" anchor="ctr"/>
+            <a:lstStyle/>
+            <a:p>
+              <a:pPr algn="ctr"/>
+              <a:endParaRPr lang="it-IT"/>
+            </a:p>
+          </p:txBody>
+        </p:sp>
+        <p:pic>
+          <p:nvPicPr>
+            <p:cNvPr id="4" name="Elemento grafico 3" descr="Luci accese con riempimento a tinta unita">
+              <a:extLst>
+                <a:ext uri="{FF2B5EF4-FFF2-40B4-BE49-F238E27FC236}">
+                  <a16:creationId xmlns:a16="http://schemas.microsoft.com/office/drawing/2014/main" id="{81FCC123-9614-4D81-8312-11AC5F870C43}"/>
+                </a:ext>
+              </a:extLst>
+            </p:cNvPr>
+            <p:cNvPicPr>
+              <a:picLocks noChangeAspect="1"/>
+            </p:cNvPicPr>
+            <p:nvPr/>
+          </p:nvPicPr>
+          <p:blipFill>
+            <a:blip r:embed="rId2">
+              <a:extLst>
+                <a:ext uri="{28A0092B-C50C-407E-A947-70E740481C1C}">
+                  <a14:useLocalDpi xmlns:a14="http://schemas.microsoft.com/office/drawing/2010/main" val="0"/>
+                </a:ext>
+                <a:ext uri="{96DAC541-7B7A-43D3-8B79-37D633B846F1}">
+                  <asvg:svgBlip xmlns:asvg="http://schemas.microsoft.com/office/drawing/2016/SVG/main" r:embed="rId3"/>
+                </a:ext>
+              </a:extLst>
+            </a:blip>
+            <a:stretch>
+              <a:fillRect/>
+            </a:stretch>
+          </p:blipFill>
+          <p:spPr>
+            <a:xfrm>
+              <a:off x="-768693" y="324398"/>
+              <a:ext cx="648387" cy="648387"/>
+            </a:xfrm>
+            <a:prstGeom prst="rect">
+              <a:avLst/>
+            </a:prstGeom>
+          </p:spPr>
+        </p:pic>
+      </p:grpSp>
+      <p:grpSp>
+        <p:nvGrpSpPr>
+          <p:cNvPr id="39" name="Gruppo 38">
+            <a:extLst>
+              <a:ext uri="{FF2B5EF4-FFF2-40B4-BE49-F238E27FC236}">
+                <a16:creationId xmlns:a16="http://schemas.microsoft.com/office/drawing/2014/main" id="{B8E855F6-DA9E-48CD-900B-C63AD66F3B76}"/>
+              </a:ext>
+            </a:extLst>
+          </p:cNvPr>
+          <p:cNvGrpSpPr/>
+          <p:nvPr/>
+        </p:nvGrpSpPr>
+        <p:grpSpPr>
+          <a:xfrm>
+            <a:off x="-849791" y="1624796"/>
+            <a:ext cx="828000" cy="828000"/>
+            <a:chOff x="-858500" y="1624796"/>
+            <a:chExt cx="828000" cy="828000"/>
+          </a:xfrm>
+        </p:grpSpPr>
+        <p:sp>
+          <p:nvSpPr>
+            <p:cNvPr id="26" name="Ovale 25">
+              <a:extLst>
+                <a:ext uri="{FF2B5EF4-FFF2-40B4-BE49-F238E27FC236}">
+                  <a16:creationId xmlns:a16="http://schemas.microsoft.com/office/drawing/2014/main" id="{3456023B-632D-46C8-8CB4-05E3EA6FF955}"/>
+                </a:ext>
+              </a:extLst>
+            </p:cNvPr>
+            <p:cNvSpPr/>
+            <p:nvPr/>
+          </p:nvSpPr>
+          <p:spPr>
+            <a:xfrm>
+              <a:off x="-858500" y="1624796"/>
+              <a:ext cx="828000" cy="828000"/>
+            </a:xfrm>
+            <a:prstGeom prst="ellipse">
+              <a:avLst/>
+            </a:prstGeom>
+            <a:solidFill>
+              <a:schemeClr val="bg1"/>
+            </a:solidFill>
+          </p:spPr>
+          <p:style>
+            <a:lnRef idx="2">
+              <a:schemeClr val="accent1">
+                <a:shade val="50000"/>
+              </a:schemeClr>
+            </a:lnRef>
+            <a:fillRef idx="1">
+              <a:schemeClr val="accent1"/>
+            </a:fillRef>
+            <a:effectRef idx="0">
+              <a:schemeClr val="accent1"/>
+            </a:effectRef>
+            <a:fontRef idx="minor">
+              <a:schemeClr val="lt1"/>
+            </a:fontRef>
+          </p:style>
+          <p:txBody>
+            <a:bodyPr rtlCol="0" anchor="ctr"/>
+            <a:lstStyle/>
+            <a:p>
+              <a:pPr algn="ctr"/>
+              <a:endParaRPr lang="it-IT"/>
+            </a:p>
+          </p:txBody>
+        </p:sp>
+        <p:pic>
+          <p:nvPicPr>
+            <p:cNvPr id="16" name="Elemento grafico 15" descr="Smartphone con riempimento a tinta unita">
+              <a:extLst>
+                <a:ext uri="{FF2B5EF4-FFF2-40B4-BE49-F238E27FC236}">
+                  <a16:creationId xmlns:a16="http://schemas.microsoft.com/office/drawing/2014/main" id="{BEC025AF-FD02-4679-96AA-627353F84BD4}"/>
+                </a:ext>
+              </a:extLst>
+            </p:cNvPr>
+            <p:cNvPicPr>
+              <a:picLocks noChangeAspect="1"/>
+            </p:cNvPicPr>
+            <p:nvPr/>
+          </p:nvPicPr>
+          <p:blipFill>
+            <a:blip r:embed="rId4">
+              <a:extLst>
+                <a:ext uri="{28A0092B-C50C-407E-A947-70E740481C1C}">
+                  <a14:useLocalDpi xmlns:a14="http://schemas.microsoft.com/office/drawing/2010/main" val="0"/>
+                </a:ext>
+                <a:ext uri="{96DAC541-7B7A-43D3-8B79-37D633B846F1}">
+                  <asvg:svgBlip xmlns:asvg="http://schemas.microsoft.com/office/drawing/2016/SVG/main" r:embed="rId5"/>
+                </a:ext>
+              </a:extLst>
+            </a:blip>
+            <a:stretch>
+              <a:fillRect/>
+            </a:stretch>
+          </p:blipFill>
+          <p:spPr>
+            <a:xfrm>
+              <a:off x="-768693" y="1714602"/>
+              <a:ext cx="648387" cy="648387"/>
+            </a:xfrm>
+            <a:prstGeom prst="rect">
+              <a:avLst/>
+            </a:prstGeom>
+          </p:spPr>
+        </p:pic>
+      </p:grpSp>
+      <p:grpSp>
+        <p:nvGrpSpPr>
+          <p:cNvPr id="41" name="Gruppo 40">
+            <a:extLst>
+              <a:ext uri="{FF2B5EF4-FFF2-40B4-BE49-F238E27FC236}">
+                <a16:creationId xmlns:a16="http://schemas.microsoft.com/office/drawing/2014/main" id="{F1FF519E-BF65-4A05-A10A-9E69B7D03861}"/>
+              </a:ext>
+            </a:extLst>
+          </p:cNvPr>
+          <p:cNvGrpSpPr/>
+          <p:nvPr/>
+        </p:nvGrpSpPr>
+        <p:grpSpPr>
+          <a:xfrm>
+            <a:off x="-849791" y="4405204"/>
+            <a:ext cx="828000" cy="828000"/>
+            <a:chOff x="-858500" y="4405204"/>
+            <a:chExt cx="828000" cy="828000"/>
+          </a:xfrm>
+        </p:grpSpPr>
+        <p:sp>
+          <p:nvSpPr>
+            <p:cNvPr id="29" name="Ovale 28">
+              <a:extLst>
+                <a:ext uri="{FF2B5EF4-FFF2-40B4-BE49-F238E27FC236}">
+                  <a16:creationId xmlns:a16="http://schemas.microsoft.com/office/drawing/2014/main" id="{1F1B3DB1-33D2-4544-8701-03DF06B775C7}"/>
+                </a:ext>
+              </a:extLst>
+            </p:cNvPr>
+            <p:cNvSpPr/>
+            <p:nvPr/>
+          </p:nvSpPr>
+          <p:spPr>
+            <a:xfrm>
+              <a:off x="-858500" y="4405204"/>
+              <a:ext cx="828000" cy="828000"/>
+            </a:xfrm>
+            <a:prstGeom prst="ellipse">
+              <a:avLst/>
+            </a:prstGeom>
+            <a:solidFill>
+              <a:schemeClr val="bg1"/>
+            </a:solidFill>
+          </p:spPr>
+          <p:style>
+            <a:lnRef idx="2">
+              <a:schemeClr val="accent1">
+                <a:shade val="50000"/>
+              </a:schemeClr>
+            </a:lnRef>
+            <a:fillRef idx="1">
+              <a:schemeClr val="accent1"/>
+            </a:fillRef>
+            <a:effectRef idx="0">
+              <a:schemeClr val="accent1"/>
+            </a:effectRef>
+            <a:fontRef idx="minor">
+              <a:schemeClr val="lt1"/>
+            </a:fontRef>
+          </p:style>
+          <p:txBody>
+            <a:bodyPr rtlCol="0" anchor="ctr"/>
+            <a:lstStyle/>
+            <a:p>
+              <a:pPr algn="ctr"/>
+              <a:endParaRPr lang="it-IT" b="1"/>
+            </a:p>
+          </p:txBody>
+        </p:sp>
+        <p:pic>
+          <p:nvPicPr>
+            <p:cNvPr id="18" name="Elemento grafico 17" descr="Internet delle cose con riempimento a tinta unita">
+              <a:extLst>
+                <a:ext uri="{FF2B5EF4-FFF2-40B4-BE49-F238E27FC236}">
+                  <a16:creationId xmlns:a16="http://schemas.microsoft.com/office/drawing/2014/main" id="{5FCEE823-AB8C-4EC7-8890-9F948E9E2CD6}"/>
+                </a:ext>
+              </a:extLst>
+            </p:cNvPr>
+            <p:cNvPicPr>
+              <a:picLocks noChangeAspect="1"/>
+            </p:cNvPicPr>
+            <p:nvPr/>
+          </p:nvPicPr>
+          <p:blipFill>
+            <a:blip r:embed="rId6">
+              <a:extLst>
+                <a:ext uri="{28A0092B-C50C-407E-A947-70E740481C1C}">
+                  <a14:useLocalDpi xmlns:a14="http://schemas.microsoft.com/office/drawing/2010/main" val="0"/>
+                </a:ext>
+                <a:ext uri="{96DAC541-7B7A-43D3-8B79-37D633B846F1}">
+                  <asvg:svgBlip xmlns:asvg="http://schemas.microsoft.com/office/drawing/2016/SVG/main" r:embed="rId7"/>
+                </a:ext>
+              </a:extLst>
+            </a:blip>
+            <a:stretch>
+              <a:fillRect/>
+            </a:stretch>
+          </p:blipFill>
+          <p:spPr>
+            <a:xfrm>
+              <a:off x="-768693" y="4495010"/>
+              <a:ext cx="648387" cy="648387"/>
+            </a:xfrm>
+            <a:prstGeom prst="rect">
+              <a:avLst/>
+            </a:prstGeom>
+          </p:spPr>
+        </p:pic>
+      </p:grpSp>
+      <p:grpSp>
+        <p:nvGrpSpPr>
+          <p:cNvPr id="42" name="Gruppo 41">
+            <a:extLst>
+              <a:ext uri="{FF2B5EF4-FFF2-40B4-BE49-F238E27FC236}">
+                <a16:creationId xmlns:a16="http://schemas.microsoft.com/office/drawing/2014/main" id="{3FDF3FC7-D886-4004-9C10-A1198BFFE5CC}"/>
+              </a:ext>
+            </a:extLst>
+          </p:cNvPr>
+          <p:cNvGrpSpPr/>
+          <p:nvPr/>
+        </p:nvGrpSpPr>
+        <p:grpSpPr>
+          <a:xfrm>
+            <a:off x="-849791" y="5795408"/>
+            <a:ext cx="828000" cy="828000"/>
+            <a:chOff x="-858500" y="5795408"/>
+            <a:chExt cx="828000" cy="828000"/>
+          </a:xfrm>
+        </p:grpSpPr>
+        <p:sp>
+          <p:nvSpPr>
+            <p:cNvPr id="28" name="Ovale 27">
+              <a:extLst>
+                <a:ext uri="{FF2B5EF4-FFF2-40B4-BE49-F238E27FC236}">
+                  <a16:creationId xmlns:a16="http://schemas.microsoft.com/office/drawing/2014/main" id="{2151308F-732A-4B43-A095-531FE5EBCBDA}"/>
+                </a:ext>
+              </a:extLst>
+            </p:cNvPr>
+            <p:cNvSpPr/>
+            <p:nvPr/>
+          </p:nvSpPr>
+          <p:spPr>
+            <a:xfrm>
+              <a:off x="-858500" y="5795408"/>
+              <a:ext cx="828000" cy="828000"/>
+            </a:xfrm>
+            <a:prstGeom prst="ellipse">
+              <a:avLst/>
+            </a:prstGeom>
+            <a:solidFill>
+              <a:schemeClr val="bg1"/>
+            </a:solidFill>
+          </p:spPr>
+          <p:style>
+            <a:lnRef idx="2">
+              <a:schemeClr val="accent1">
+                <a:shade val="50000"/>
+              </a:schemeClr>
+            </a:lnRef>
+            <a:fillRef idx="1">
+              <a:schemeClr val="accent1"/>
+            </a:fillRef>
+            <a:effectRef idx="0">
+              <a:schemeClr val="accent1"/>
+            </a:effectRef>
+            <a:fontRef idx="minor">
+              <a:schemeClr val="lt1"/>
+            </a:fontRef>
+          </p:style>
+          <p:txBody>
+            <a:bodyPr rtlCol="0" anchor="ctr"/>
+            <a:lstStyle/>
+            <a:p>
+              <a:pPr algn="ctr"/>
+              <a:endParaRPr lang="it-IT" b="1"/>
+            </a:p>
+          </p:txBody>
+        </p:sp>
+        <p:pic>
+          <p:nvPicPr>
+            <p:cNvPr id="20" name="Elemento grafico 19" descr="Utenti con riempimento a tinta unita">
+              <a:extLst>
+                <a:ext uri="{FF2B5EF4-FFF2-40B4-BE49-F238E27FC236}">
+                  <a16:creationId xmlns:a16="http://schemas.microsoft.com/office/drawing/2014/main" id="{DAED8FB1-C6AC-4ECE-8495-E67BE27B857D}"/>
+                </a:ext>
+              </a:extLst>
+            </p:cNvPr>
+            <p:cNvPicPr>
+              <a:picLocks noChangeAspect="1"/>
+            </p:cNvPicPr>
+            <p:nvPr/>
+          </p:nvPicPr>
+          <p:blipFill>
+            <a:blip r:embed="rId8">
+              <a:extLst>
+                <a:ext uri="{28A0092B-C50C-407E-A947-70E740481C1C}">
+                  <a14:useLocalDpi xmlns:a14="http://schemas.microsoft.com/office/drawing/2010/main" val="0"/>
+                </a:ext>
+                <a:ext uri="{96DAC541-7B7A-43D3-8B79-37D633B846F1}">
+                  <asvg:svgBlip xmlns:asvg="http://schemas.microsoft.com/office/drawing/2016/SVG/main" r:embed="rId9"/>
+                </a:ext>
+              </a:extLst>
+            </a:blip>
+            <a:stretch>
+              <a:fillRect/>
+            </a:stretch>
+          </p:blipFill>
+          <p:spPr>
+            <a:xfrm>
+              <a:off x="-768693" y="5891301"/>
+              <a:ext cx="648387" cy="648387"/>
+            </a:xfrm>
+            <a:prstGeom prst="rect">
+              <a:avLst/>
+            </a:prstGeom>
+          </p:spPr>
+        </p:pic>
+      </p:grpSp>
+      <p:grpSp>
+        <p:nvGrpSpPr>
+          <p:cNvPr id="40" name="Gruppo 39">
+            <a:extLst>
+              <a:ext uri="{FF2B5EF4-FFF2-40B4-BE49-F238E27FC236}">
+                <a16:creationId xmlns:a16="http://schemas.microsoft.com/office/drawing/2014/main" id="{C45713E6-B7D9-48C1-B57B-A2C5E93838D9}"/>
+              </a:ext>
+            </a:extLst>
+          </p:cNvPr>
+          <p:cNvGrpSpPr/>
+          <p:nvPr/>
+        </p:nvGrpSpPr>
+        <p:grpSpPr>
+          <a:xfrm>
+            <a:off x="-845820" y="3015000"/>
+            <a:ext cx="828000" cy="828000"/>
+            <a:chOff x="-858500" y="3015000"/>
+            <a:chExt cx="828000" cy="828000"/>
+          </a:xfrm>
+        </p:grpSpPr>
+        <p:sp>
+          <p:nvSpPr>
+            <p:cNvPr id="25" name="Ovale 24">
+              <a:extLst>
+                <a:ext uri="{FF2B5EF4-FFF2-40B4-BE49-F238E27FC236}">
+                  <a16:creationId xmlns:a16="http://schemas.microsoft.com/office/drawing/2014/main" id="{003BFCB9-7560-4E7F-A580-8E63D63D9E64}"/>
+                </a:ext>
+              </a:extLst>
+            </p:cNvPr>
+            <p:cNvSpPr/>
+            <p:nvPr/>
+          </p:nvSpPr>
+          <p:spPr>
+            <a:xfrm>
+              <a:off x="-858500" y="3015000"/>
+              <a:ext cx="828000" cy="828000"/>
+            </a:xfrm>
+            <a:prstGeom prst="ellipse">
+              <a:avLst/>
+            </a:prstGeom>
+            <a:solidFill>
+              <a:schemeClr val="bg1"/>
+            </a:solidFill>
+          </p:spPr>
+          <p:style>
+            <a:lnRef idx="2">
+              <a:schemeClr val="accent1">
+                <a:shade val="50000"/>
+              </a:schemeClr>
+            </a:lnRef>
+            <a:fillRef idx="1">
+              <a:schemeClr val="accent1"/>
+            </a:fillRef>
+            <a:effectRef idx="0">
+              <a:schemeClr val="accent1"/>
+            </a:effectRef>
+            <a:fontRef idx="minor">
+              <a:schemeClr val="lt1"/>
+            </a:fontRef>
+          </p:style>
+          <p:txBody>
+            <a:bodyPr rtlCol="0" anchor="ctr"/>
+            <a:lstStyle/>
+            <a:p>
+              <a:pPr algn="ctr"/>
+              <a:endParaRPr lang="it-IT" b="1" dirty="0"/>
+            </a:p>
+          </p:txBody>
+        </p:sp>
+        <p:pic>
+          <p:nvPicPr>
+            <p:cNvPr id="14" name="Elemento grafico 13" descr="Database con riempimento a tinta unita">
+              <a:extLst>
+                <a:ext uri="{FF2B5EF4-FFF2-40B4-BE49-F238E27FC236}">
+                  <a16:creationId xmlns:a16="http://schemas.microsoft.com/office/drawing/2014/main" id="{06B3ACA5-2EB2-4595-9623-C8B505F1420C}"/>
+                </a:ext>
+              </a:extLst>
+            </p:cNvPr>
+            <p:cNvPicPr>
+              <a:picLocks noChangeAspect="1"/>
+            </p:cNvPicPr>
+            <p:nvPr/>
+          </p:nvPicPr>
+          <p:blipFill>
+            <a:blip r:embed="rId10">
+              <a:extLst>
+                <a:ext uri="{28A0092B-C50C-407E-A947-70E740481C1C}">
+                  <a14:useLocalDpi xmlns:a14="http://schemas.microsoft.com/office/drawing/2010/main" val="0"/>
+                </a:ext>
+                <a:ext uri="{96DAC541-7B7A-43D3-8B79-37D633B846F1}">
+                  <asvg:svgBlip xmlns:asvg="http://schemas.microsoft.com/office/drawing/2016/SVG/main" r:embed="rId11"/>
+                </a:ext>
+              </a:extLst>
+            </a:blip>
+            <a:stretch>
+              <a:fillRect/>
+            </a:stretch>
+          </p:blipFill>
+          <p:spPr>
+            <a:xfrm>
+              <a:off x="-768693" y="3111254"/>
+              <a:ext cx="648387" cy="648387"/>
+            </a:xfrm>
+            <a:prstGeom prst="rect">
+              <a:avLst/>
+            </a:prstGeom>
+          </p:spPr>
+        </p:pic>
+      </p:grpSp>
+      <p:sp>
+        <p:nvSpPr>
+          <p:cNvPr id="36" name="Figura a mano libera: forma 35">
+            <a:extLst>
+              <a:ext uri="{FF2B5EF4-FFF2-40B4-BE49-F238E27FC236}">
+                <a16:creationId xmlns:a16="http://schemas.microsoft.com/office/drawing/2014/main" id="{E78984A9-19B7-4778-9382-2396ACD05FAD}"/>
+              </a:ext>
+            </a:extLst>
+          </p:cNvPr>
+          <p:cNvSpPr/>
+          <p:nvPr/>
+        </p:nvSpPr>
+        <p:spPr>
+          <a:xfrm rot="10800000">
+            <a:off x="1" y="-8164133"/>
+            <a:ext cx="1131006" cy="17468848"/>
+          </a:xfrm>
+          <a:custGeom>
+            <a:avLst/>
+            <a:gdLst>
+              <a:gd name="connsiteX0" fmla="*/ 18 w 1131006"/>
+              <a:gd name="connsiteY0" fmla="*/ 9544266 h 17468848"/>
+              <a:gd name="connsiteX1" fmla="*/ 726281 w 1131006"/>
+              <a:gd name="connsiteY1" fmla="*/ 8656653 h 17468848"/>
+              <a:gd name="connsiteX2" fmla="*/ 19 w 1131006"/>
+              <a:gd name="connsiteY2" fmla="*/ 7791666 h 17468848"/>
+              <a:gd name="connsiteX3" fmla="*/ 1131006 w 1131006"/>
+              <a:gd name="connsiteY3" fmla="*/ 17468848 h 17468848"/>
+              <a:gd name="connsiteX4" fmla="*/ 1 w 1131006"/>
+              <a:gd name="connsiteY4" fmla="*/ 17468848 h 17468848"/>
+              <a:gd name="connsiteX5" fmla="*/ 1 w 1131006"/>
+              <a:gd name="connsiteY5" fmla="*/ 0 h 17468848"/>
+              <a:gd name="connsiteX6" fmla="*/ 1131006 w 1131006"/>
+              <a:gd name="connsiteY6" fmla="*/ 0 h 17468848"/>
+            </a:gdLst>
+            <a:ahLst/>
+            <a:cxnLst>
+              <a:cxn ang="0">
+                <a:pos x="connsiteX0" y="connsiteY0"/>
+              </a:cxn>
+              <a:cxn ang="0">
+                <a:pos x="connsiteX1" y="connsiteY1"/>
+              </a:cxn>
+              <a:cxn ang="0">
+                <a:pos x="connsiteX2" y="connsiteY2"/>
+              </a:cxn>
+              <a:cxn ang="0">
+                <a:pos x="connsiteX3" y="connsiteY3"/>
+              </a:cxn>
+              <a:cxn ang="0">
+                <a:pos x="connsiteX4" y="connsiteY4"/>
+              </a:cxn>
+              <a:cxn ang="0">
+                <a:pos x="connsiteX5" y="connsiteY5"/>
+              </a:cxn>
+              <a:cxn ang="0">
+                <a:pos x="connsiteX6" y="connsiteY6"/>
+              </a:cxn>
+            </a:cxnLst>
+            <a:rect l="l" t="t" r="r" b="b"/>
+            <a:pathLst>
+              <a:path w="1131006" h="17468848">
+                <a:moveTo>
+                  <a:pt x="18" y="9544266"/>
+                </a:moveTo>
+                <a:cubicBezTo>
+                  <a:pt x="6061" y="8986287"/>
+                  <a:pt x="725441" y="9180690"/>
+                  <a:pt x="726281" y="8656653"/>
+                </a:cubicBezTo>
+                <a:cubicBezTo>
+                  <a:pt x="727138" y="8121997"/>
+                  <a:pt x="-4353" y="8366616"/>
+                  <a:pt x="19" y="7791666"/>
+                </a:cubicBezTo>
+                <a:close/>
+                <a:moveTo>
+                  <a:pt x="1131006" y="17468848"/>
+                </a:moveTo>
+                <a:lnTo>
+                  <a:pt x="1" y="17468848"/>
+                </a:lnTo>
+                <a:lnTo>
+                  <a:pt x="1" y="0"/>
+                </a:lnTo>
+                <a:lnTo>
+                  <a:pt x="1131006" y="0"/>
+                </a:lnTo>
+                <a:close/>
+              </a:path>
+            </a:pathLst>
+          </a:custGeom>
+          <a:solidFill>
+            <a:schemeClr val="bg1"/>
+          </a:solidFill>
+          <a:ln>
+            <a:noFill/>
+          </a:ln>
+        </p:spPr>
+        <p:style>
+          <a:lnRef idx="2">
+            <a:schemeClr val="accent1">
+              <a:shade val="50000"/>
+            </a:schemeClr>
+          </a:lnRef>
+          <a:fillRef idx="1">
+            <a:schemeClr val="accent1"/>
+          </a:fillRef>
+          <a:effectRef idx="0">
+            <a:schemeClr val="accent1"/>
+          </a:effectRef>
+          <a:fontRef idx="minor">
+            <a:schemeClr val="lt1"/>
+          </a:fontRef>
+        </p:style>
+        <p:txBody>
+          <a:bodyPr wrap="square" rtlCol="0" anchor="ctr">
+            <a:noAutofit/>
+          </a:bodyPr>
+          <a:lstStyle/>
+          <a:p>
+            <a:pPr algn="ctr"/>
+            <a:endParaRPr lang="it-IT" b="1" dirty="0"/>
+          </a:p>
+        </p:txBody>
+      </p:sp>
       <p:pic>
         <p:nvPicPr>
           <p:cNvPr id="5" name="Immagine 4">
@@ -8199,7 +9296,7 @@
 </p:sld>
 </file>
 
-<file path=ppt/slides/slide4.xml><?xml version="1.0" encoding="utf-8"?>
+<file path=ppt/slides/slide5.xml><?xml version="1.0" encoding="utf-8"?>
 <p:sld xmlns:a="http://schemas.openxmlformats.org/drawingml/2006/main" xmlns:r="http://schemas.openxmlformats.org/officeDocument/2006/relationships" xmlns:p="http://schemas.openxmlformats.org/presentationml/2006/main">
   <p:cSld>
     <p:bg>
@@ -9304,7 +10401,7 @@
 </p:sld>
 </file>
 
-<file path=ppt/slides/slide5.xml><?xml version="1.0" encoding="utf-8"?>
+<file path=ppt/slides/slide6.xml><?xml version="1.0" encoding="utf-8"?>
 <p:sld xmlns:a="http://schemas.openxmlformats.org/drawingml/2006/main" xmlns:r="http://schemas.openxmlformats.org/officeDocument/2006/relationships" xmlns:p="http://schemas.openxmlformats.org/presentationml/2006/main">
   <p:cSld>
     <p:bg>
@@ -10409,7 +11506,7 @@
 </p:sld>
 </file>
 
-<file path=ppt/slides/slide6.xml><?xml version="1.0" encoding="utf-8"?>
+<file path=ppt/slides/slide7.xml><?xml version="1.0" encoding="utf-8"?>
 <p:sld xmlns:a="http://schemas.openxmlformats.org/drawingml/2006/main" xmlns:r="http://schemas.openxmlformats.org/officeDocument/2006/relationships" xmlns:p="http://schemas.openxmlformats.org/presentationml/2006/main">
   <p:cSld>
     <p:bg>
@@ -11514,7 +12611,7 @@
 </p:sld>
 </file>
 
-<file path=ppt/slides/slide7.xml><?xml version="1.0" encoding="utf-8"?>
+<file path=ppt/slides/slide8.xml><?xml version="1.0" encoding="utf-8"?>
 <p:sld xmlns:a="http://schemas.openxmlformats.org/drawingml/2006/main" xmlns:r="http://schemas.openxmlformats.org/officeDocument/2006/relationships" xmlns:p="http://schemas.openxmlformats.org/presentationml/2006/main">
   <p:cSld>
     <p:bg>
@@ -12608,8 +13705,8 @@
         </p:nvSpPr>
         <p:spPr>
           <a:xfrm>
-            <a:off x="1800225" y="719692"/>
-            <a:ext cx="2882071" cy="369332"/>
+            <a:off x="1782808" y="603453"/>
+            <a:ext cx="2677336" cy="369332"/>
           </a:xfrm>
           <a:prstGeom prst="rect">
             <a:avLst/>
@@ -12627,12 +13724,246 @@
                 <a:solidFill>
                   <a:schemeClr val="bg1"/>
                 </a:solidFill>
+                <a:latin typeface="Verdana" panose="020B0604030504040204" pitchFamily="34" charset="0"/>
+                <a:ea typeface="Verdana" panose="020B0604030504040204" pitchFamily="34" charset="0"/>
               </a:rPr>
-              <a:t>Cosa abbiamo in programma</a:t>
+              <a:t>Hey! Non è finita qui!</a:t>
             </a:r>
           </a:p>
         </p:txBody>
       </p:sp>
+      <p:sp>
+        <p:nvSpPr>
+          <p:cNvPr id="3" name="CasellaDiTesto 2">
+            <a:extLst>
+              <a:ext uri="{FF2B5EF4-FFF2-40B4-BE49-F238E27FC236}">
+                <a16:creationId xmlns:a16="http://schemas.microsoft.com/office/drawing/2014/main" id="{006A59AC-1E0C-489E-907B-C1CB8A543E9B}"/>
+              </a:ext>
+            </a:extLst>
+          </p:cNvPr>
+          <p:cNvSpPr txBox="1"/>
+          <p:nvPr/>
+        </p:nvSpPr>
+        <p:spPr>
+          <a:xfrm>
+            <a:off x="1782808" y="1281345"/>
+            <a:ext cx="3332964" cy="338554"/>
+          </a:xfrm>
+          <a:prstGeom prst="rect">
+            <a:avLst/>
+          </a:prstGeom>
+          <a:noFill/>
+        </p:spPr>
+        <p:txBody>
+          <a:bodyPr wrap="none" rtlCol="0">
+            <a:spAutoFit/>
+          </a:bodyPr>
+          <a:lstStyle/>
+          <a:p>
+            <a:r>
+              <a:rPr lang="it-IT" sz="1600" dirty="0">
+                <a:solidFill>
+                  <a:schemeClr val="bg1"/>
+                </a:solidFill>
+                <a:latin typeface="Montserrat" panose="00000500000000000000" pitchFamily="2" charset="0"/>
+              </a:rPr>
+              <a:t>Cosa abbiamo in programma?</a:t>
+            </a:r>
+          </a:p>
+        </p:txBody>
+      </p:sp>
+      <p:pic>
+        <p:nvPicPr>
+          <p:cNvPr id="21" name="Immagine 20">
+            <a:extLst>
+              <a:ext uri="{FF2B5EF4-FFF2-40B4-BE49-F238E27FC236}">
+                <a16:creationId xmlns:a16="http://schemas.microsoft.com/office/drawing/2014/main" id="{D99D42A8-71D9-4BC7-804C-A85BEF60C9DE}"/>
+              </a:ext>
+            </a:extLst>
+          </p:cNvPr>
+          <p:cNvPicPr>
+            <a:picLocks noChangeAspect="1"/>
+          </p:cNvPicPr>
+          <p:nvPr/>
+        </p:nvPicPr>
+        <p:blipFill>
+          <a:blip r:embed="rId28">
+            <a:extLst>
+              <a:ext uri="{28A0092B-C50C-407E-A947-70E740481C1C}">
+                <a14:useLocalDpi xmlns:a14="http://schemas.microsoft.com/office/drawing/2010/main" val="0"/>
+              </a:ext>
+            </a:extLst>
+          </a:blip>
+          <a:stretch>
+            <a:fillRect/>
+          </a:stretch>
+        </p:blipFill>
+        <p:spPr>
+          <a:xfrm>
+            <a:off x="1838936" y="2042436"/>
+            <a:ext cx="2444171" cy="1629447"/>
+          </a:xfrm>
+          <a:prstGeom prst="ellipse">
+            <a:avLst/>
+          </a:prstGeom>
+        </p:spPr>
+      </p:pic>
+      <p:pic>
+        <p:nvPicPr>
+          <p:cNvPr id="23" name="Immagine 22">
+            <a:extLst>
+              <a:ext uri="{FF2B5EF4-FFF2-40B4-BE49-F238E27FC236}">
+                <a16:creationId xmlns:a16="http://schemas.microsoft.com/office/drawing/2014/main" id="{AC80B94F-54BE-4349-94D6-B5672367FE26}"/>
+              </a:ext>
+            </a:extLst>
+          </p:cNvPr>
+          <p:cNvPicPr>
+            <a:picLocks noChangeAspect="1"/>
+          </p:cNvPicPr>
+          <p:nvPr/>
+        </p:nvPicPr>
+        <p:blipFill rotWithShape="1">
+          <a:blip r:embed="rId29">
+            <a:extLst>
+              <a:ext uri="{28A0092B-C50C-407E-A947-70E740481C1C}">
+                <a14:useLocalDpi xmlns:a14="http://schemas.microsoft.com/office/drawing/2010/main" val="0"/>
+              </a:ext>
+            </a:extLst>
+          </a:blip>
+          <a:srcRect l="1588" r="47419"/>
+          <a:stretch/>
+        </p:blipFill>
+        <p:spPr>
+          <a:xfrm>
+            <a:off x="4563291" y="2247402"/>
+            <a:ext cx="2238104" cy="1097280"/>
+          </a:xfrm>
+          <a:prstGeom prst="rect">
+            <a:avLst/>
+          </a:prstGeom>
+          <a:solidFill>
+            <a:srgbClr val="FFFFFF">
+              <a:shade val="85000"/>
+            </a:srgbClr>
+          </a:solidFill>
+          <a:ln w="190500" cap="rnd">
+            <a:solidFill>
+              <a:srgbClr val="FFFFFF"/>
+            </a:solidFill>
+          </a:ln>
+          <a:effectLst>
+            <a:outerShdw blurRad="50000" algn="tl" rotWithShape="0">
+              <a:srgbClr val="000000">
+                <a:alpha val="41000"/>
+              </a:srgbClr>
+            </a:outerShdw>
+          </a:effectLst>
+          <a:scene3d>
+            <a:camera prst="orthographicFront"/>
+            <a:lightRig rig="twoPt" dir="t">
+              <a:rot lat="0" lon="0" rev="7800000"/>
+            </a:lightRig>
+          </a:scene3d>
+          <a:sp3d contourW="6350">
+            <a:bevelT w="50800" h="16510"/>
+            <a:contourClr>
+              <a:srgbClr val="C0C0C0"/>
+            </a:contourClr>
+          </a:sp3d>
+        </p:spPr>
+      </p:pic>
+      <p:grpSp>
+        <p:nvGrpSpPr>
+          <p:cNvPr id="47" name="Gruppo 46">
+            <a:extLst>
+              <a:ext uri="{FF2B5EF4-FFF2-40B4-BE49-F238E27FC236}">
+                <a16:creationId xmlns:a16="http://schemas.microsoft.com/office/drawing/2014/main" id="{F9BFEF7C-7A58-4AA3-B36E-983C899D3659}"/>
+              </a:ext>
+            </a:extLst>
+          </p:cNvPr>
+          <p:cNvGrpSpPr/>
+          <p:nvPr/>
+        </p:nvGrpSpPr>
+        <p:grpSpPr>
+          <a:xfrm>
+            <a:off x="6922246" y="1333825"/>
+            <a:ext cx="1876595" cy="3046668"/>
+            <a:chOff x="6831895" y="1333825"/>
+            <a:chExt cx="1876595" cy="3046668"/>
+          </a:xfrm>
+        </p:grpSpPr>
+        <p:pic>
+          <p:nvPicPr>
+            <p:cNvPr id="44" name="Immagine 43">
+              <a:extLst>
+                <a:ext uri="{FF2B5EF4-FFF2-40B4-BE49-F238E27FC236}">
+                  <a16:creationId xmlns:a16="http://schemas.microsoft.com/office/drawing/2014/main" id="{D5909D0E-B57E-4EFC-A36B-43E94E25BFEF}"/>
+                </a:ext>
+              </a:extLst>
+            </p:cNvPr>
+            <p:cNvPicPr>
+              <a:picLocks noChangeAspect="1"/>
+            </p:cNvPicPr>
+            <p:nvPr/>
+          </p:nvPicPr>
+          <p:blipFill rotWithShape="1">
+            <a:blip r:embed="rId30">
+              <a:extLst>
+                <a:ext uri="{28A0092B-C50C-407E-A947-70E740481C1C}">
+                  <a14:useLocalDpi xmlns:a14="http://schemas.microsoft.com/office/drawing/2010/main" val="0"/>
+                </a:ext>
+              </a:extLst>
+            </a:blip>
+            <a:srcRect l="37944" t="21233" r="38027" b="19526"/>
+            <a:stretch/>
+          </p:blipFill>
+          <p:spPr>
+            <a:xfrm>
+              <a:off x="6831895" y="1333825"/>
+              <a:ext cx="1876595" cy="3046668"/>
+            </a:xfrm>
+            <a:prstGeom prst="rect">
+              <a:avLst/>
+            </a:prstGeom>
+          </p:spPr>
+        </p:pic>
+        <p:pic>
+          <p:nvPicPr>
+            <p:cNvPr id="46" name="Immagine 45">
+              <a:extLst>
+                <a:ext uri="{FF2B5EF4-FFF2-40B4-BE49-F238E27FC236}">
+                  <a16:creationId xmlns:a16="http://schemas.microsoft.com/office/drawing/2014/main" id="{6106CBA5-50BF-4CB8-9767-C1EBD23472F7}"/>
+                </a:ext>
+              </a:extLst>
+            </p:cNvPr>
+            <p:cNvPicPr>
+              <a:picLocks noChangeAspect="1"/>
+            </p:cNvPicPr>
+            <p:nvPr/>
+          </p:nvPicPr>
+          <p:blipFill>
+            <a:blip r:embed="rId12">
+              <a:extLst>
+                <a:ext uri="{28A0092B-C50C-407E-A947-70E740481C1C}">
+                  <a14:useLocalDpi xmlns:a14="http://schemas.microsoft.com/office/drawing/2010/main" val="0"/>
+                </a:ext>
+              </a:extLst>
+            </a:blip>
+            <a:stretch>
+              <a:fillRect/>
+            </a:stretch>
+          </p:blipFill>
+          <p:spPr>
+            <a:xfrm>
+              <a:off x="7160507" y="2055616"/>
+              <a:ext cx="1219370" cy="1219370"/>
+            </a:xfrm>
+            <a:prstGeom prst="rect">
+              <a:avLst/>
+            </a:prstGeom>
+          </p:spPr>
+        </p:pic>
+      </p:grpSp>
     </p:spTree>
     <p:extLst>
       <p:ext uri="{BB962C8B-B14F-4D97-AF65-F5344CB8AC3E}">
@@ -12655,6 +13986,195 @@
       </p:transition>
     </mc:Fallback>
   </mc:AlternateContent>
+  <p:timing>
+    <p:tnLst>
+      <p:par>
+        <p:cTn id="1" dur="indefinite" restart="never" nodeType="tmRoot">
+          <p:childTnLst>
+            <p:seq concurrent="1" nextAc="seek">
+              <p:cTn id="2" dur="indefinite" nodeType="mainSeq">
+                <p:childTnLst>
+                  <p:par>
+                    <p:cTn id="3" fill="hold">
+                      <p:stCondLst>
+                        <p:cond delay="indefinite"/>
+                      </p:stCondLst>
+                      <p:childTnLst>
+                        <p:par>
+                          <p:cTn id="4" fill="hold">
+                            <p:stCondLst>
+                              <p:cond delay="0"/>
+                            </p:stCondLst>
+                            <p:childTnLst>
+                              <p:par>
+                                <p:cTn id="5" presetID="10" presetClass="entr" presetSubtype="0" fill="hold" nodeType="clickEffect">
+                                  <p:stCondLst>
+                                    <p:cond delay="0"/>
+                                  </p:stCondLst>
+                                  <p:childTnLst>
+                                    <p:set>
+                                      <p:cBhvr>
+                                        <p:cTn id="6" dur="1" fill="hold">
+                                          <p:stCondLst>
+                                            <p:cond delay="0"/>
+                                          </p:stCondLst>
+                                        </p:cTn>
+                                        <p:tgtEl>
+                                          <p:spTgt spid="21"/>
+                                        </p:tgtEl>
+                                        <p:attrNameLst>
+                                          <p:attrName>style.visibility</p:attrName>
+                                        </p:attrNameLst>
+                                      </p:cBhvr>
+                                      <p:to>
+                                        <p:strVal val="visible"/>
+                                      </p:to>
+                                    </p:set>
+                                    <p:animEffect transition="in" filter="fade">
+                                      <p:cBhvr>
+                                        <p:cTn id="7" dur="500"/>
+                                        <p:tgtEl>
+                                          <p:spTgt spid="21"/>
+                                        </p:tgtEl>
+                                      </p:cBhvr>
+                                    </p:animEffect>
+                                  </p:childTnLst>
+                                </p:cTn>
+                              </p:par>
+                            </p:childTnLst>
+                          </p:cTn>
+                        </p:par>
+                      </p:childTnLst>
+                    </p:cTn>
+                  </p:par>
+                  <p:par>
+                    <p:cTn id="8" fill="hold">
+                      <p:stCondLst>
+                        <p:cond delay="indefinite"/>
+                      </p:stCondLst>
+                      <p:childTnLst>
+                        <p:par>
+                          <p:cTn id="9" fill="hold">
+                            <p:stCondLst>
+                              <p:cond delay="0"/>
+                            </p:stCondLst>
+                            <p:childTnLst>
+                              <p:par>
+                                <p:cTn id="10" presetID="10" presetClass="entr" presetSubtype="0" fill="hold" nodeType="clickEffect">
+                                  <p:stCondLst>
+                                    <p:cond delay="0"/>
+                                  </p:stCondLst>
+                                  <p:childTnLst>
+                                    <p:set>
+                                      <p:cBhvr>
+                                        <p:cTn id="11" dur="1" fill="hold">
+                                          <p:stCondLst>
+                                            <p:cond delay="0"/>
+                                          </p:stCondLst>
+                                        </p:cTn>
+                                        <p:tgtEl>
+                                          <p:spTgt spid="23"/>
+                                        </p:tgtEl>
+                                        <p:attrNameLst>
+                                          <p:attrName>style.visibility</p:attrName>
+                                        </p:attrNameLst>
+                                      </p:cBhvr>
+                                      <p:to>
+                                        <p:strVal val="visible"/>
+                                      </p:to>
+                                    </p:set>
+                                    <p:animEffect transition="in" filter="fade">
+                                      <p:cBhvr>
+                                        <p:cTn id="12" dur="500"/>
+                                        <p:tgtEl>
+                                          <p:spTgt spid="23"/>
+                                        </p:tgtEl>
+                                      </p:cBhvr>
+                                    </p:animEffect>
+                                  </p:childTnLst>
+                                </p:cTn>
+                              </p:par>
+                            </p:childTnLst>
+                          </p:cTn>
+                        </p:par>
+                      </p:childTnLst>
+                    </p:cTn>
+                  </p:par>
+                  <p:par>
+                    <p:cTn id="13" fill="hold">
+                      <p:stCondLst>
+                        <p:cond delay="indefinite"/>
+                      </p:stCondLst>
+                      <p:childTnLst>
+                        <p:par>
+                          <p:cTn id="14" fill="hold">
+                            <p:stCondLst>
+                              <p:cond delay="0"/>
+                            </p:stCondLst>
+                            <p:childTnLst>
+                              <p:par>
+                                <p:cTn id="15" presetID="10" presetClass="entr" presetSubtype="0" fill="hold" nodeType="clickEffect">
+                                  <p:stCondLst>
+                                    <p:cond delay="0"/>
+                                  </p:stCondLst>
+                                  <p:childTnLst>
+                                    <p:set>
+                                      <p:cBhvr>
+                                        <p:cTn id="16" dur="1" fill="hold">
+                                          <p:stCondLst>
+                                            <p:cond delay="0"/>
+                                          </p:stCondLst>
+                                        </p:cTn>
+                                        <p:tgtEl>
+                                          <p:spTgt spid="47"/>
+                                        </p:tgtEl>
+                                        <p:attrNameLst>
+                                          <p:attrName>style.visibility</p:attrName>
+                                        </p:attrNameLst>
+                                      </p:cBhvr>
+                                      <p:to>
+                                        <p:strVal val="visible"/>
+                                      </p:to>
+                                    </p:set>
+                                    <p:animEffect transition="in" filter="fade">
+                                      <p:cBhvr>
+                                        <p:cTn id="17" dur="500"/>
+                                        <p:tgtEl>
+                                          <p:spTgt spid="47"/>
+                                        </p:tgtEl>
+                                      </p:cBhvr>
+                                    </p:animEffect>
+                                  </p:childTnLst>
+                                </p:cTn>
+                              </p:par>
+                            </p:childTnLst>
+                          </p:cTn>
+                        </p:par>
+                      </p:childTnLst>
+                    </p:cTn>
+                  </p:par>
+                </p:childTnLst>
+              </p:cTn>
+              <p:prevCondLst>
+                <p:cond evt="onPrev" delay="0">
+                  <p:tgtEl>
+                    <p:sldTgt/>
+                  </p:tgtEl>
+                </p:cond>
+              </p:prevCondLst>
+              <p:nextCondLst>
+                <p:cond evt="onNext" delay="0">
+                  <p:tgtEl>
+                    <p:sldTgt/>
+                  </p:tgtEl>
+                </p:cond>
+              </p:nextCondLst>
+            </p:seq>
+          </p:childTnLst>
+        </p:cTn>
+      </p:par>
+    </p:tnLst>
+  </p:timing>
 </p:sld>
 </file>
 

</xml_diff>